<commit_message>
Update device model summaries
</commit_message>
<xml_diff>
--- a/device_model/wfi32_curiosity-1.pptx
+++ b/device_model/wfi32_curiosity-1.pptx
@@ -198,7 +198,7 @@
           <a:p>
             <a:fld id="{FD501506-38D8-4E22-82D3-5FD4ADAE0670}" type="datetimeFigureOut">
               <a:rPr lang="en-US" smtClean="0"/>
-              <a:t>4/10/23</a:t>
+              <a:t>4/13/23</a:t>
             </a:fld>
             <a:endParaRPr lang="en-US"/>
           </a:p>
@@ -650,7 +650,7 @@
           <a:p>
             <a:fld id="{3620004A-883C-4245-985B-D234050ABC20}" type="datetimeFigureOut">
               <a:rPr lang="en-US" smtClean="0"/>
-              <a:t>4/10/23</a:t>
+              <a:t>4/13/23</a:t>
             </a:fld>
             <a:endParaRPr lang="en-US"/>
           </a:p>
@@ -2612,7 +2612,7 @@
           <a:p>
             <a:fld id="{3620004A-883C-4245-985B-D234050ABC20}" type="datetimeFigureOut">
               <a:rPr lang="en-US" smtClean="0"/>
-              <a:t>4/10/23</a:t>
+              <a:t>4/13/23</a:t>
             </a:fld>
             <a:endParaRPr lang="en-US"/>
           </a:p>
@@ -3168,7 +3168,7 @@
           <p:nvPr>
             <p:extLst>
               <p:ext uri="{D42A27DB-BD31-4B8C-83A1-F6EECF244321}">
-                <p14:modId xmlns:p14="http://schemas.microsoft.com/office/powerpoint/2010/main" val="3697442774"/>
+                <p14:modId xmlns:p14="http://schemas.microsoft.com/office/powerpoint/2010/main" val="2793533614"/>
               </p:ext>
             </p:extLst>
           </p:nvPr>
@@ -5242,7 +5242,7 @@
                           <a:latin typeface="Courier New" panose="02070309020205020404" pitchFamily="49" charset="0"/>
                           <a:cs typeface="Courier New" panose="02070309020205020404" pitchFamily="49" charset="0"/>
                         </a:rPr>
-                        <a:t>”:{“button_name”:“SW1”, “press_count”:7}}</a:t>
+                        <a:t>”:{“button_name”:“SW1”,“press_count”:7}}</a:t>
                       </a:r>
                     </a:p>
                   </a:txBody>
@@ -5390,14 +5390,14 @@
           <p:nvPr>
             <p:extLst>
               <p:ext uri="{D42A27DB-BD31-4B8C-83A1-F6EECF244321}">
-                <p14:modId xmlns:p14="http://schemas.microsoft.com/office/powerpoint/2010/main" val="3305829525"/>
+                <p14:modId xmlns:p14="http://schemas.microsoft.com/office/powerpoint/2010/main" val="2879103891"/>
               </p:ext>
             </p:extLst>
           </p:nvPr>
         </p:nvGraphicFramePr>
         <p:xfrm>
           <a:off x="226243" y="1467501"/>
-          <a:ext cx="8691514" cy="2654249"/>
+          <a:ext cx="8691514" cy="2471369"/>
         </p:xfrm>
         <a:graphic>
           <a:graphicData uri="http://schemas.openxmlformats.org/drawingml/2006/table">
@@ -5960,37 +5960,9 @@
                           <a:latin typeface="Courier New" panose="02070309020205020404" pitchFamily="49" charset="0"/>
                           <a:cs typeface="Courier New" panose="02070309020205020404" pitchFamily="49" charset="0"/>
                         </a:rPr>
-                        <a:t>”:{“ac”:200,“av”:55, “ad”:“OK”,“value”:10}}</a:t>
-                      </a:r>
-                    </a:p>
-                  </a:txBody>
-                  <a:tcPr/>
-                </a:tc>
-                <a:extLst>
-                  <a:ext uri="{0D108BD9-81ED-4DB2-BD59-A6C34878D82A}">
-                    <a16:rowId xmlns:a16="http://schemas.microsoft.com/office/drawing/2014/main" val="4060793695"/>
-                  </a:ext>
-                </a:extLst>
-              </a:tr>
-              <a:tr h="285517">
-                <a:tc>
-                  <a:txBody>
-                    <a:bodyPr/>
-                    <a:lstStyle/>
-                    <a:p>
-                      <a:pPr algn="ctr"/>
-                      <a:r>
-                        <a:rPr lang="en-US" sz="1200" dirty="0"/>
-                        <a:t>Command (Request)</a:t>
-                      </a:r>
-                    </a:p>
-                  </a:txBody>
-                  <a:tcPr/>
-                </a:tc>
-                <a:tc>
-                  <a:txBody>
-                    <a:bodyPr/>
-                    <a:lstStyle/>
+                        <a:t>”:{“ac”:200,“av”:55,</a:t>
+                      </a:r>
+                    </a:p>
                     <a:p>
                       <a:pPr marL="0" marR="0" lvl="0" indent="0" algn="ctr" defTabSz="914400" rtl="0" eaLnBrk="1" fontAlgn="auto" latinLnBrk="0" hangingPunct="1">
                         <a:lnSpc>
@@ -6017,7 +5989,28 @@
                           <a:latin typeface="Courier New" panose="02070309020205020404" pitchFamily="49" charset="0"/>
                           <a:cs typeface="Courier New" panose="02070309020205020404" pitchFamily="49" charset="0"/>
                         </a:rPr>
-                        <a:t>reboot</a:t>
+                        <a:t>“ad”:“OK”,“value”:10}}</a:t>
+                      </a:r>
+                    </a:p>
+                  </a:txBody>
+                  <a:tcPr/>
+                </a:tc>
+                <a:extLst>
+                  <a:ext uri="{0D108BD9-81ED-4DB2-BD59-A6C34878D82A}">
+                    <a16:rowId xmlns:a16="http://schemas.microsoft.com/office/drawing/2014/main" val="4060793695"/>
+                  </a:ext>
+                </a:extLst>
+              </a:tr>
+              <a:tr h="285517">
+                <a:tc>
+                  <a:txBody>
+                    <a:bodyPr/>
+                    <a:lstStyle/>
+                    <a:p>
+                      <a:pPr algn="ctr"/>
+                      <a:r>
+                        <a:rPr lang="en-US" sz="1200" dirty="0"/>
+                        <a:t>Command (Request)</a:t>
                       </a:r>
                     </a:p>
                   </a:txBody>
@@ -6046,6 +6039,42 @@
                         <a:defRPr/>
                       </a:pPr>
                       <a:r>
+                        <a:rPr lang="en-US" sz="1200" dirty="0">
+                          <a:solidFill>
+                            <a:schemeClr val="tx1"/>
+                          </a:solidFill>
+                          <a:latin typeface="Courier New" panose="02070309020205020404" pitchFamily="49" charset="0"/>
+                          <a:cs typeface="Courier New" panose="02070309020205020404" pitchFamily="49" charset="0"/>
+                        </a:rPr>
+                        <a:t>reboot</a:t>
+                      </a:r>
+                    </a:p>
+                  </a:txBody>
+                  <a:tcPr/>
+                </a:tc>
+                <a:tc>
+                  <a:txBody>
+                    <a:bodyPr/>
+                    <a:lstStyle/>
+                    <a:p>
+                      <a:pPr marL="0" marR="0" lvl="0" indent="0" algn="ctr" defTabSz="914400" rtl="0" eaLnBrk="1" fontAlgn="auto" latinLnBrk="0" hangingPunct="1">
+                        <a:lnSpc>
+                          <a:spcPct val="100000"/>
+                        </a:lnSpc>
+                        <a:spcBef>
+                          <a:spcPts val="0"/>
+                        </a:spcBef>
+                        <a:spcAft>
+                          <a:spcPts val="0"/>
+                        </a:spcAft>
+                        <a:buClrTx/>
+                        <a:buSzTx/>
+                        <a:buFontTx/>
+                        <a:buNone/>
+                        <a:tabLst/>
+                        <a:defRPr/>
+                      </a:pPr>
+                      <a:r>
                         <a:rPr lang="en-US" sz="1100" dirty="0">
                           <a:solidFill>
                             <a:schemeClr val="tx1"/>
@@ -6089,7 +6118,7 @@
                           <a:latin typeface="Courier New" panose="02070309020205020404" pitchFamily="49" charset="0"/>
                           <a:cs typeface="Courier New" panose="02070309020205020404" pitchFamily="49" charset="0"/>
                         </a:rPr>
-                        <a:t>{“payload”:{“delay”:“PT5S”}}</a:t>
+                        <a:t>{“delay”:“PT5S”}</a:t>
                       </a:r>
                     </a:p>
                   </a:txBody>
@@ -6234,7 +6263,7 @@
                           <a:latin typeface="Courier New" panose="02070309020205020404" pitchFamily="49" charset="0"/>
                           <a:cs typeface="Courier New" panose="02070309020205020404" pitchFamily="49" charset="0"/>
                         </a:rPr>
-                        <a:t>{“response”:{“status”:“success”,“delay”:5}}</a:t>
+                        <a:t>{“status”:“success”,“delay”:5}</a:t>
                       </a:r>
                     </a:p>
                   </a:txBody>
@@ -6386,7 +6415,7 @@
                           <a:latin typeface="Courier New" panose="02070309020205020404" pitchFamily="49" charset="0"/>
                           <a:cs typeface="Courier New" panose="02070309020205020404" pitchFamily="49" charset="0"/>
                         </a:rPr>
-                        <a:t>{“payload”:{“</a:t>
+                        <a:t>{“</a:t>
                       </a:r>
                       <a:r>
                         <a:rPr lang="en-US" sz="1200" dirty="0" err="1">
@@ -6406,7 +6435,7 @@
                           <a:latin typeface="Courier New" panose="02070309020205020404" pitchFamily="49" charset="0"/>
                           <a:cs typeface="Courier New" panose="02070309020205020404" pitchFamily="49" charset="0"/>
                         </a:rPr>
-                        <a:t>”:“Hello World!!!”}}</a:t>
+                        <a:t>”:“Hello World!!!”}</a:t>
                       </a:r>
                     </a:p>
                   </a:txBody>
@@ -6558,7 +6587,7 @@
                           <a:latin typeface="Courier New" panose="02070309020205020404" pitchFamily="49" charset="0"/>
                           <a:cs typeface="Courier New" panose="02070309020205020404" pitchFamily="49" charset="0"/>
                         </a:rPr>
-                        <a:t>{“response”:{“</a:t>
+                        <a:t>{“</a:t>
                       </a:r>
                       <a:r>
                         <a:rPr lang="en-US" sz="1200" dirty="0" err="1">
@@ -6568,7 +6597,7 @@
                           <a:latin typeface="Courier New" panose="02070309020205020404" pitchFamily="49" charset="0"/>
                           <a:cs typeface="Courier New" panose="02070309020205020404" pitchFamily="49" charset="0"/>
                         </a:rPr>
-                        <a:t>status”:“received</a:t>
+                        <a:t>status”:“Message</a:t>
                       </a:r>
                       <a:r>
                         <a:rPr lang="en-US" sz="1200" dirty="0">
@@ -6578,7 +6607,7 @@
                           <a:latin typeface="Courier New" panose="02070309020205020404" pitchFamily="49" charset="0"/>
                           <a:cs typeface="Courier New" panose="02070309020205020404" pitchFamily="49" charset="0"/>
                         </a:rPr>
-                        <a:t>”}}</a:t>
+                        <a:t> received!!!”}</a:t>
                       </a:r>
                     </a:p>
                   </a:txBody>

</xml_diff>